<commit_message>
Add demo to ppt.
</commit_message>
<xml_diff>
--- a/决赛答辩-AnneY.pptx
+++ b/决赛答辩-AnneY.pptx
@@ -5935,7 +5935,7 @@
         </p:nvSpPr>
         <p:spPr>
           <a:xfrm>
-            <a:off x="694690" y="1604645"/>
+            <a:off x="694690" y="987425"/>
             <a:ext cx="7754620" cy="1224280"/>
           </a:xfrm>
         </p:spPr>
@@ -5972,58 +5972,158 @@
               </a:rPr>
               <a:t>作品演示及答辩</a:t>
             </a:r>
-            <a:br>
-              <a:rPr lang="zh-CN" altLang="en-US" sz="3000" b="1" dirty="0">
-                <a:solidFill>
-                  <a:srgbClr val="0029B5"/>
-                </a:solidFill>
-                <a:latin typeface="Microsoft YaHei Bold" panose="020B0503020204020204" charset="-122"/>
-                <a:ea typeface="Microsoft YaHei Bold" panose="020B0503020204020204" charset="-122"/>
-                <a:sym typeface="+mn-ea"/>
+            <a:endParaRPr lang="zh-CN" altLang="en-US" sz="2000" dirty="0">
+              <a:solidFill>
+                <a:schemeClr val="tx1">
+                  <a:lumMod val="75000"/>
+                  <a:lumOff val="25000"/>
+                </a:schemeClr>
+              </a:solidFill>
+              <a:latin typeface="Microsoft YaHei" panose="020B0503020204020204" charset="-122"/>
+              <a:ea typeface="Microsoft YaHei" panose="020B0503020204020204" charset="-122"/>
+              <a:sym typeface="+mn-ea"/>
+            </a:endParaRPr>
+          </a:p>
+        </p:txBody>
+      </p:sp>
+      <p:sp>
+        <p:nvSpPr>
+          <p:cNvPr id="11" name="文本框 10">
+            <a:extLst>
+              <a:ext uri="{FF2B5EF4-FFF2-40B4-BE49-F238E27FC236}">
+                <a16:creationId xmlns:a16="http://schemas.microsoft.com/office/drawing/2014/main" id="{EAE4129A-B269-4604-A62C-A778E17AEC03}"/>
+              </a:ext>
+            </a:extLst>
+          </p:cNvPr>
+          <p:cNvSpPr txBox="1"/>
+          <p:nvPr/>
+        </p:nvSpPr>
+        <p:spPr>
+          <a:xfrm>
+            <a:off x="1859994" y="2468880"/>
+            <a:ext cx="4583430" cy="1324080"/>
+          </a:xfrm>
+          <a:prstGeom prst="rect">
+            <a:avLst/>
+          </a:prstGeom>
+          <a:noFill/>
+        </p:spPr>
+        <p:txBody>
+          <a:bodyPr wrap="square">
+            <a:spAutoFit/>
+          </a:bodyPr>
+          <a:lstStyle/>
+          <a:p>
+            <a:pPr indent="266700">
+              <a:lnSpc>
+                <a:spcPct val="200000"/>
+              </a:lnSpc>
+            </a:pPr>
+            <a:r>
+              <a:rPr lang="zh-CN" altLang="en-US" sz="1400" b="1" kern="100" dirty="0">
+                <a:effectLst/>
+                <a:latin typeface="等线" panose="02010600030101010101" pitchFamily="2" charset="-122"/>
+                <a:ea typeface="微软雅黑" panose="020B0503020204020204" pitchFamily="34" charset="-122"/>
+                <a:cs typeface="Times New Roman" panose="02020603050405020304" pitchFamily="18" charset="0"/>
               </a:rPr>
-            </a:br>
-            <a:r>
-              <a:rPr lang="zh-CN" altLang="en-US" sz="2000" dirty="0">
-                <a:solidFill>
-                  <a:schemeClr val="tx1">
-                    <a:lumMod val="75000"/>
-                    <a:lumOff val="25000"/>
-                  </a:schemeClr>
-                </a:solidFill>
-                <a:latin typeface="Microsoft YaHei" panose="020B0503020204020204" charset="-122"/>
-                <a:ea typeface="Microsoft YaHei" panose="020B0503020204020204" charset="-122"/>
-                <a:sym typeface="+mn-ea"/>
+              <a:t>项目运行</a:t>
+            </a:r>
+            <a:r>
+              <a:rPr lang="en-US" altLang="zh-CN" sz="1400" b="1" kern="100" dirty="0">
+                <a:effectLst/>
+                <a:latin typeface="等线" panose="02010600030101010101" pitchFamily="2" charset="-122"/>
+                <a:ea typeface="微软雅黑" panose="020B0503020204020204" pitchFamily="34" charset="-122"/>
+                <a:cs typeface="Times New Roman" panose="02020603050405020304" pitchFamily="18" charset="0"/>
               </a:rPr>
-              <a:t>（这一部分需线上演示作品</a:t>
-            </a:r>
-            <a:r>
-              <a:rPr lang="en-US" altLang="zh-CN" sz="2000" dirty="0">
-                <a:solidFill>
-                  <a:schemeClr val="tx1">
-                    <a:lumMod val="75000"/>
-                    <a:lumOff val="25000"/>
-                  </a:schemeClr>
-                </a:solidFill>
-                <a:latin typeface="Microsoft YaHei" panose="020B0503020204020204" charset="-122"/>
-                <a:ea typeface="Microsoft YaHei" panose="020B0503020204020204" charset="-122"/>
-                <a:sym typeface="+mn-ea"/>
+              <a:t>Demo</a:t>
+            </a:r>
+            <a:r>
+              <a:rPr lang="zh-CN" altLang="en-US" sz="1400" b="1" kern="100" dirty="0">
+                <a:effectLst/>
+                <a:latin typeface="等线" panose="02010600030101010101" pitchFamily="2" charset="-122"/>
+                <a:ea typeface="微软雅黑" panose="020B0503020204020204" pitchFamily="34" charset="-122"/>
+                <a:cs typeface="Times New Roman" panose="02020603050405020304" pitchFamily="18" charset="0"/>
               </a:rPr>
-              <a:t>demo</a:t>
-            </a:r>
-            <a:r>
-              <a:rPr lang="zh-CN" altLang="en-US" sz="2000" dirty="0">
-                <a:solidFill>
-                  <a:schemeClr val="tx1">
-                    <a:lumMod val="75000"/>
-                    <a:lumOff val="25000"/>
-                  </a:schemeClr>
-                </a:solidFill>
-                <a:latin typeface="Microsoft YaHei" panose="020B0503020204020204" charset="-122"/>
-                <a:ea typeface="Microsoft YaHei" panose="020B0503020204020204" charset="-122"/>
-                <a:sym typeface="+mn-ea"/>
+              <a:t>请访问 </a:t>
+            </a:r>
+            <a:r>
+              <a:rPr lang="en-US" altLang="zh-CN" sz="1400" b="1" kern="100" dirty="0">
+                <a:effectLst/>
+                <a:latin typeface="等线" panose="02010600030101010101" pitchFamily="2" charset="-122"/>
+                <a:ea typeface="微软雅黑" panose="020B0503020204020204" pitchFamily="34" charset="-122"/>
+                <a:cs typeface="Times New Roman" panose="02020603050405020304" pitchFamily="18" charset="0"/>
+                <a:hlinkClick r:id="rId6"/>
               </a:rPr>
-              <a:t>，并回答评委问题）</a:t>
-            </a:r>
+              <a:t>https://mvn.sharpdawn.com</a:t>
+            </a:r>
+            <a:endParaRPr lang="en-US" altLang="zh-CN" sz="1400" b="1" kern="100" dirty="0">
+              <a:effectLst/>
+              <a:latin typeface="等线" panose="02010600030101010101" pitchFamily="2" charset="-122"/>
+              <a:ea typeface="微软雅黑" panose="020B0503020204020204" pitchFamily="34" charset="-122"/>
+              <a:cs typeface="Times New Roman" panose="02020603050405020304" pitchFamily="18" charset="0"/>
+            </a:endParaRPr>
+          </a:p>
+          <a:p>
+            <a:pPr indent="266700">
+              <a:lnSpc>
+                <a:spcPct val="200000"/>
+              </a:lnSpc>
+            </a:pPr>
+            <a:r>
+              <a:rPr lang="zh-CN" altLang="en-US" sz="1400" b="1" kern="100" dirty="0">
+                <a:effectLst/>
+                <a:latin typeface="等线" panose="02010600030101010101" pitchFamily="2" charset="-122"/>
+                <a:ea typeface="微软雅黑" panose="020B0503020204020204" pitchFamily="34" charset="-122"/>
+                <a:cs typeface="Times New Roman" panose="02020603050405020304" pitchFamily="18" charset="0"/>
+              </a:rPr>
+              <a:t>测试用户 </a:t>
+            </a:r>
+            <a:r>
+              <a:rPr lang="en-US" altLang="zh-CN" sz="1400" b="1" kern="100" dirty="0">
+                <a:effectLst/>
+                <a:latin typeface="等线" panose="02010600030101010101" pitchFamily="2" charset="-122"/>
+                <a:ea typeface="微软雅黑" panose="020B0503020204020204" pitchFamily="34" charset="-122"/>
+                <a:cs typeface="Times New Roman" panose="02020603050405020304" pitchFamily="18" charset="0"/>
+                <a:hlinkClick r:id="rId7"/>
+              </a:rPr>
+              <a:t>demo@gmail.com</a:t>
+            </a:r>
+            <a:endParaRPr lang="en-US" altLang="zh-CN" sz="1400" b="1" kern="100" dirty="0">
+              <a:effectLst/>
+              <a:latin typeface="等线" panose="02010600030101010101" pitchFamily="2" charset="-122"/>
+              <a:ea typeface="微软雅黑" panose="020B0503020204020204" pitchFamily="34" charset="-122"/>
+              <a:cs typeface="Times New Roman" panose="02020603050405020304" pitchFamily="18" charset="0"/>
+            </a:endParaRPr>
+          </a:p>
+          <a:p>
+            <a:pPr indent="266700">
+              <a:lnSpc>
+                <a:spcPct val="200000"/>
+              </a:lnSpc>
+            </a:pPr>
+            <a:r>
+              <a:rPr lang="zh-CN" altLang="en-US" sz="1400" b="1" kern="100" dirty="0">
+                <a:effectLst/>
+                <a:latin typeface="等线" panose="02010600030101010101" pitchFamily="2" charset="-122"/>
+                <a:ea typeface="微软雅黑" panose="020B0503020204020204" pitchFamily="34" charset="-122"/>
+                <a:cs typeface="Times New Roman" panose="02020603050405020304" pitchFamily="18" charset="0"/>
+              </a:rPr>
+              <a:t>密码</a:t>
+            </a:r>
+            <a:r>
+              <a:rPr lang="en-US" altLang="zh-CN" sz="1400" b="1" kern="100" dirty="0">
+                <a:effectLst/>
+                <a:latin typeface="等线" panose="02010600030101010101" pitchFamily="2" charset="-122"/>
+                <a:ea typeface="微软雅黑" panose="020B0503020204020204" pitchFamily="34" charset="-122"/>
+                <a:cs typeface="Times New Roman" panose="02020603050405020304" pitchFamily="18" charset="0"/>
+              </a:rPr>
+              <a:t>123456</a:t>
+            </a:r>
+            <a:endParaRPr lang="en-US" altLang="zh-CN" sz="1400" b="1" kern="100" dirty="0">
+              <a:latin typeface="等线" panose="02010600030101010101" pitchFamily="2" charset="-122"/>
+              <a:ea typeface="微软雅黑" panose="020B0503020204020204" pitchFamily="34" charset="-122"/>
+              <a:cs typeface="Times New Roman" panose="02020603050405020304" pitchFamily="18" charset="0"/>
+            </a:endParaRPr>
           </a:p>
         </p:txBody>
       </p:sp>

</xml_diff>